<commit_message>
Add Test mode fix bug at Lot Cell Modify Presentation PPT
</commit_message>
<xml_diff>
--- a/Documents/FinalPresentation.pptx
+++ b/Documents/FinalPresentation.pptx
@@ -114,6 +114,11 @@
       </a:defRPr>
     </a:lvl9pPr>
   </p:defaultTextStyle>
+  <p:extLst>
+    <p:ext uri="{EFAFB233-063F-42B5-8137-9DF3F51BA10A}">
+      <p15:sldGuideLst xmlns:p15="http://schemas.microsoft.com/office/powerpoint/2012/main"/>
+    </p:ext>
+  </p:extLst>
 </p:presentation>
 </file>
 
@@ -248,7 +253,7 @@
           <a:p>
             <a:fld id="{C39A9944-4924-464D-BAA0-BC3A4FEC260C}" type="datetimeFigureOut">
               <a:rPr lang="en-CA" smtClean="0"/>
-              <a:t>2015-08-08</a:t>
+              <a:t>2015-08-09</a:t>
             </a:fld>
             <a:endParaRPr lang="en-CA"/>
           </a:p>
@@ -418,7 +423,7 @@
           <a:p>
             <a:fld id="{C39A9944-4924-464D-BAA0-BC3A4FEC260C}" type="datetimeFigureOut">
               <a:rPr lang="en-CA" smtClean="0"/>
-              <a:t>2015-08-08</a:t>
+              <a:t>2015-08-09</a:t>
             </a:fld>
             <a:endParaRPr lang="en-CA"/>
           </a:p>
@@ -598,7 +603,7 @@
           <a:p>
             <a:fld id="{C39A9944-4924-464D-BAA0-BC3A4FEC260C}" type="datetimeFigureOut">
               <a:rPr lang="en-CA" smtClean="0"/>
-              <a:t>2015-08-08</a:t>
+              <a:t>2015-08-09</a:t>
             </a:fld>
             <a:endParaRPr lang="en-CA"/>
           </a:p>
@@ -768,7 +773,7 @@
           <a:p>
             <a:fld id="{C39A9944-4924-464D-BAA0-BC3A4FEC260C}" type="datetimeFigureOut">
               <a:rPr lang="en-CA" smtClean="0"/>
-              <a:t>2015-08-08</a:t>
+              <a:t>2015-08-09</a:t>
             </a:fld>
             <a:endParaRPr lang="en-CA"/>
           </a:p>
@@ -1014,7 +1019,7 @@
           <a:p>
             <a:fld id="{C39A9944-4924-464D-BAA0-BC3A4FEC260C}" type="datetimeFigureOut">
               <a:rPr lang="en-CA" smtClean="0"/>
-              <a:t>2015-08-08</a:t>
+              <a:t>2015-08-09</a:t>
             </a:fld>
             <a:endParaRPr lang="en-CA"/>
           </a:p>
@@ -1246,7 +1251,7 @@
           <a:p>
             <a:fld id="{C39A9944-4924-464D-BAA0-BC3A4FEC260C}" type="datetimeFigureOut">
               <a:rPr lang="en-CA" smtClean="0"/>
-              <a:t>2015-08-08</a:t>
+              <a:t>2015-08-09</a:t>
             </a:fld>
             <a:endParaRPr lang="en-CA"/>
           </a:p>
@@ -1613,7 +1618,7 @@
           <a:p>
             <a:fld id="{C39A9944-4924-464D-BAA0-BC3A4FEC260C}" type="datetimeFigureOut">
               <a:rPr lang="en-CA" smtClean="0"/>
-              <a:t>2015-08-08</a:t>
+              <a:t>2015-08-09</a:t>
             </a:fld>
             <a:endParaRPr lang="en-CA"/>
           </a:p>
@@ -1731,7 +1736,7 @@
           <a:p>
             <a:fld id="{C39A9944-4924-464D-BAA0-BC3A4FEC260C}" type="datetimeFigureOut">
               <a:rPr lang="en-CA" smtClean="0"/>
-              <a:t>2015-08-08</a:t>
+              <a:t>2015-08-09</a:t>
             </a:fld>
             <a:endParaRPr lang="en-CA"/>
           </a:p>
@@ -1826,7 +1831,7 @@
           <a:p>
             <a:fld id="{C39A9944-4924-464D-BAA0-BC3A4FEC260C}" type="datetimeFigureOut">
               <a:rPr lang="en-CA" smtClean="0"/>
-              <a:t>2015-08-08</a:t>
+              <a:t>2015-08-09</a:t>
             </a:fld>
             <a:endParaRPr lang="en-CA"/>
           </a:p>
@@ -2103,7 +2108,7 @@
           <a:p>
             <a:fld id="{C39A9944-4924-464D-BAA0-BC3A4FEC260C}" type="datetimeFigureOut">
               <a:rPr lang="en-CA" smtClean="0"/>
-              <a:t>2015-08-08</a:t>
+              <a:t>2015-08-09</a:t>
             </a:fld>
             <a:endParaRPr lang="en-CA"/>
           </a:p>
@@ -2356,7 +2361,7 @@
           <a:p>
             <a:fld id="{C39A9944-4924-464D-BAA0-BC3A4FEC260C}" type="datetimeFigureOut">
               <a:rPr lang="en-CA" smtClean="0"/>
-              <a:t>2015-08-08</a:t>
+              <a:t>2015-08-09</a:t>
             </a:fld>
             <a:endParaRPr lang="en-CA"/>
           </a:p>
@@ -2577,7 +2582,7 @@
           <a:p>
             <a:fld id="{C39A9944-4924-464D-BAA0-BC3A4FEC260C}" type="datetimeFigureOut">
               <a:rPr lang="en-CA" smtClean="0"/>
-              <a:t>2015-08-08</a:t>
+              <a:t>2015-08-09</a:t>
             </a:fld>
             <a:endParaRPr lang="en-CA"/>
           </a:p>
@@ -3510,10 +3515,10 @@
           <a:p>
             <a:pPr algn="l"/>
             <a:r>
-              <a:rPr lang="en-US" sz="4800" dirty="0" smtClean="0"/>
+              <a:rPr lang="en-US" sz="4800" b="1" dirty="0" smtClean="0"/>
               <a:t>Code Metric</a:t>
             </a:r>
-            <a:endParaRPr lang="en-CA" sz="4800" dirty="0"/>
+            <a:endParaRPr lang="en-CA" sz="4800" b="1" dirty="0"/>
           </a:p>
         </p:txBody>
       </p:sp>
@@ -3617,12 +3622,12 @@
           <a:graphicData uri="http://schemas.openxmlformats.org/presentationml/2006/ole">
             <mc:AlternateContent xmlns:mc="http://schemas.openxmlformats.org/markup-compatibility/2006">
               <mc:Choice xmlns:v="urn:schemas-microsoft-com:vml" Requires="v">
-                <p:oleObj spid="_x0000_s2056" name="Worksheet" showAsIcon="1" r:id="rId5" imgW="914400" imgH="771480" progId="Excel.Sheet.12">
+                <p:oleObj spid="_x0000_s2057" name="Worksheet" showAsIcon="1" r:id="rId6" imgW="914400" imgH="771480" progId="Excel.Sheet.12">
                   <p:embed/>
                 </p:oleObj>
               </mc:Choice>
               <mc:Fallback>
-                <p:oleObj name="Worksheet" showAsIcon="1" r:id="rId5" imgW="914400" imgH="771480" progId="Excel.Sheet.12">
+                <p:oleObj name="Worksheet" showAsIcon="1" r:id="rId6" imgW="914400" imgH="771480" progId="Excel.Sheet.12">
                   <p:embed/>
                   <p:pic>
                     <p:nvPicPr>
@@ -3631,7 +3636,7 @@
                       <p:nvPr/>
                     </p:nvPicPr>
                     <p:blipFill>
-                      <a:blip r:embed="rId6"/>
+                      <a:blip r:embed="rId7"/>
                       <a:stretch>
                         <a:fillRect/>
                       </a:stretch>
@@ -3812,7 +3817,7 @@
           <a:lstStyle/>
           <a:p>
             <a:r>
-              <a:rPr lang="en-US" dirty="0" smtClean="0">
+              <a:rPr lang="en-US" b="1" dirty="0" smtClean="0">
                 <a:solidFill>
                   <a:schemeClr val="tx1">
                     <a:lumMod val="85000"/>
@@ -3822,7 +3827,7 @@
               </a:rPr>
               <a:t>Background</a:t>
             </a:r>
-            <a:endParaRPr lang="en-CA" dirty="0">
+            <a:endParaRPr lang="en-CA" b="1" dirty="0">
               <a:solidFill>
                 <a:schemeClr val="tx1">
                   <a:lumMod val="85000"/>
@@ -3851,7 +3856,7 @@
           <a:lstStyle/>
           <a:p>
             <a:r>
-              <a:rPr lang="en-US" sz="2400" dirty="0" smtClean="0">
+              <a:rPr lang="en-CA" sz="2400" dirty="0">
                 <a:solidFill>
                   <a:schemeClr val="tx1">
                     <a:lumMod val="85000"/>
@@ -3859,12 +3864,12 @@
                   </a:schemeClr>
                 </a:solidFill>
               </a:rPr>
-              <a:t>Object : To Practice designing and object oriented programming skills</a:t>
-            </a:r>
-          </a:p>
-          <a:p>
-            <a:r>
-              <a:rPr lang="en-US" sz="2400" dirty="0" smtClean="0">
+              <a:t>Objective: design, develop and test in object oriented structure</a:t>
+            </a:r>
+          </a:p>
+          <a:p>
+            <a:r>
+              <a:rPr lang="en-CA" sz="2400" dirty="0">
                 <a:solidFill>
                   <a:schemeClr val="tx1">
                     <a:lumMod val="85000"/>
@@ -3872,12 +3877,12 @@
                   </a:schemeClr>
                 </a:solidFill>
               </a:rPr>
-              <a:t>Simulating Monopoly Game, but customized to finish within 2 weeks</a:t>
-            </a:r>
-          </a:p>
-          <a:p>
-            <a:r>
-              <a:rPr lang="en-US" sz="2400" dirty="0" smtClean="0">
+              <a:t>Customize Monopoly Game to finish within 2 weeks</a:t>
+            </a:r>
+          </a:p>
+          <a:p>
+            <a:r>
+              <a:rPr lang="en-CA" sz="2400" dirty="0">
                 <a:solidFill>
                   <a:schemeClr val="tx1">
                     <a:lumMod val="85000"/>
@@ -3889,9 +3894,8 @@
             </a:r>
           </a:p>
           <a:p>
-            <a:pPr lvl="1"/>
-            <a:r>
-              <a:rPr lang="en-US" dirty="0" smtClean="0">
+            <a:r>
+              <a:rPr lang="en-CA" sz="2400" dirty="0">
                 <a:solidFill>
                   <a:schemeClr val="tx1">
                     <a:lumMod val="85000"/>
@@ -3899,10 +3903,12 @@
                   </a:schemeClr>
                 </a:solidFill>
               </a:rPr>
-              <a:t>1</a:t>
-            </a:r>
-            <a:r>
-              <a:rPr lang="en-US" baseline="30000" dirty="0" smtClean="0">
+              <a:t>1st : with 1 cell</a:t>
+            </a:r>
+          </a:p>
+          <a:p>
+            <a:r>
+              <a:rPr lang="en-CA" sz="2400" dirty="0">
                 <a:solidFill>
                   <a:schemeClr val="tx1">
                     <a:lumMod val="85000"/>
@@ -3910,10 +3916,10 @@
                   </a:schemeClr>
                 </a:solidFill>
               </a:rPr>
-              <a:t>st</a:t>
-            </a:r>
-            <a:r>
-              <a:rPr lang="en-US" dirty="0" smtClean="0">
+              <a:t>2nd: with various cells (</a:t>
+            </a:r>
+            <a:r>
+              <a:rPr lang="en-CA" sz="2400" dirty="0" err="1">
                 <a:solidFill>
                   <a:schemeClr val="tx1">
                     <a:lumMod val="85000"/>
@@ -3921,13 +3927,10 @@
                   </a:schemeClr>
                 </a:solidFill>
               </a:rPr>
-              <a:t> : with 1 kind of cell</a:t>
-            </a:r>
-          </a:p>
-          <a:p>
-            <a:pPr lvl="1"/>
-            <a:r>
-              <a:rPr lang="en-US" dirty="0" smtClean="0">
+              <a:t>LotCell</a:t>
+            </a:r>
+            <a:r>
+              <a:rPr lang="en-CA" sz="2400" dirty="0">
                 <a:solidFill>
                   <a:schemeClr val="tx1">
                     <a:lumMod val="85000"/>
@@ -3935,10 +3938,10 @@
                   </a:schemeClr>
                 </a:solidFill>
               </a:rPr>
-              <a:t>2</a:t>
-            </a:r>
-            <a:r>
-              <a:rPr lang="en-US" baseline="30000" dirty="0" smtClean="0">
+              <a:t>, </a:t>
+            </a:r>
+            <a:r>
+              <a:rPr lang="en-CA" sz="2400" dirty="0" err="1">
                 <a:solidFill>
                   <a:schemeClr val="tx1">
                     <a:lumMod val="85000"/>
@@ -3946,10 +3949,10 @@
                   </a:schemeClr>
                 </a:solidFill>
               </a:rPr>
-              <a:t>nd</a:t>
-            </a:r>
-            <a:r>
-              <a:rPr lang="en-US" dirty="0" smtClean="0">
+              <a:t>JailCell</a:t>
+            </a:r>
+            <a:r>
+              <a:rPr lang="en-CA" sz="2400" dirty="0">
                 <a:solidFill>
                   <a:schemeClr val="tx1">
                     <a:lumMod val="85000"/>
@@ -3957,12 +3960,12 @@
                   </a:schemeClr>
                 </a:solidFill>
               </a:rPr>
-              <a:t>: with various kind of cell -&gt; depending on cell, various rules are applied</a:t>
-            </a:r>
-          </a:p>
-          <a:p>
-            <a:r>
-              <a:rPr lang="en-US" sz="2400" dirty="0" smtClean="0">
+              <a:t>..)</a:t>
+            </a:r>
+          </a:p>
+          <a:p>
+            <a:r>
+              <a:rPr lang="en-CA" sz="2400" dirty="0">
                 <a:solidFill>
                   <a:schemeClr val="tx1">
                     <a:lumMod val="85000"/>
@@ -3970,10 +3973,12 @@
                   </a:schemeClr>
                 </a:solidFill>
               </a:rPr>
-              <a:t>To minimize integration risk, </a:t>
-            </a:r>
-            <a:r>
-              <a:rPr lang="en-US" sz="2400" dirty="0" err="1" smtClean="0">
+              <a:t>To minimize integration risk, GitHub was used with continuous merging</a:t>
+            </a:r>
+          </a:p>
+          <a:p>
+            <a:r>
+              <a:rPr lang="en-CA" sz="2400" dirty="0">
                 <a:solidFill>
                   <a:schemeClr val="tx1">
                     <a:lumMod val="85000"/>
@@ -3981,40 +3986,8 @@
                   </a:schemeClr>
                 </a:solidFill>
               </a:rPr>
-              <a:t>Github</a:t>
-            </a:r>
-            <a:r>
-              <a:rPr lang="en-US" sz="2400" dirty="0" smtClean="0">
-                <a:solidFill>
-                  <a:schemeClr val="tx1">
-                    <a:lumMod val="85000"/>
-                    <a:lumOff val="15000"/>
-                  </a:schemeClr>
-                </a:solidFill>
-              </a:rPr>
-              <a:t> was used : merging continuously</a:t>
-            </a:r>
-          </a:p>
-          <a:p>
-            <a:r>
-              <a:rPr lang="en-US" sz="2400" dirty="0" smtClean="0">
-                <a:solidFill>
-                  <a:schemeClr val="tx1">
-                    <a:lumMod val="85000"/>
-                    <a:lumOff val="15000"/>
-                  </a:schemeClr>
-                </a:solidFill>
-              </a:rPr>
-              <a:t>Due to lack of skill and time, we didn’t made unit test code. Instead, test cases were made and tested. </a:t>
-            </a:r>
-            <a:endParaRPr lang="en-CA" sz="2400" dirty="0">
-              <a:solidFill>
-                <a:schemeClr val="tx1">
-                  <a:lumMod val="85000"/>
-                  <a:lumOff val="15000"/>
-                </a:schemeClr>
-              </a:solidFill>
-            </a:endParaRPr>
+              <a:t>Due to lack of time, we didn’t made unit test code. Instead, test cases were made and tested. </a:t>
+            </a:r>
           </a:p>
         </p:txBody>
       </p:sp>
@@ -4078,13 +4051,18 @@
             <p:ph type="title"/>
           </p:nvPr>
         </p:nvSpPr>
-        <p:spPr/>
+        <p:spPr>
+          <a:xfrm>
+            <a:off x="598170" y="365125"/>
+            <a:ext cx="10515600" cy="1325563"/>
+          </a:xfrm>
+        </p:spPr>
         <p:txBody>
           <a:bodyPr/>
           <a:lstStyle/>
           <a:p>
             <a:r>
-              <a:rPr lang="en-US" dirty="0" smtClean="0">
+              <a:rPr lang="en-US" b="1" dirty="0" smtClean="0">
                 <a:solidFill>
                   <a:schemeClr val="tx1">
                     <a:lumMod val="85000"/>
@@ -4094,7 +4072,7 @@
               </a:rPr>
               <a:t>Game Rules (1/2)</a:t>
             </a:r>
-            <a:endParaRPr lang="en-CA" dirty="0">
+            <a:endParaRPr lang="en-CA" b="1" dirty="0">
               <a:solidFill>
                 <a:schemeClr val="tx1">
                   <a:lumMod val="85000"/>
@@ -4117,8 +4095,8 @@
         </p:nvSpPr>
         <p:spPr>
           <a:xfrm>
-            <a:off x="838200" y="1690688"/>
-            <a:ext cx="10515600" cy="5032375"/>
+            <a:off x="598170" y="1690688"/>
+            <a:ext cx="10995660" cy="5032375"/>
           </a:xfrm>
         </p:spPr>
         <p:txBody>
@@ -4128,7 +4106,7 @@
           <a:lstStyle/>
           <a:p>
             <a:r>
-              <a:rPr lang="en-US" sz="2400" dirty="0" smtClean="0">
+              <a:rPr lang="en-CA" sz="2400" dirty="0">
                 <a:solidFill>
                   <a:schemeClr val="tx1">
                     <a:lumMod val="85000"/>
@@ -4136,12 +4114,12 @@
                   </a:schemeClr>
                 </a:solidFill>
               </a:rPr>
-              <a:t>Number of Player will be between 2 and 8.</a:t>
-            </a:r>
-          </a:p>
-          <a:p>
-            <a:r>
-              <a:rPr lang="en-US" sz="2400" dirty="0" smtClean="0">
+              <a:t>Number of Players will be between 2 and 8.</a:t>
+            </a:r>
+          </a:p>
+          <a:p>
+            <a:r>
+              <a:rPr lang="en-CA" sz="2400" dirty="0">
                 <a:solidFill>
                   <a:schemeClr val="tx1">
                     <a:lumMod val="85000"/>
@@ -4149,12 +4127,12 @@
                   </a:schemeClr>
                 </a:solidFill>
               </a:rPr>
-              <a:t>Game starts with getting # of Player from user and play until one Player remained</a:t>
-            </a:r>
-          </a:p>
-          <a:p>
-            <a:r>
-              <a:rPr lang="en-US" sz="2400" dirty="0" smtClean="0">
+              <a:t>Game starts with getting number of Players from user and playing until one Player remains</a:t>
+            </a:r>
+          </a:p>
+          <a:p>
+            <a:r>
+              <a:rPr lang="en-CA" sz="2400" dirty="0">
                 <a:solidFill>
                   <a:schemeClr val="tx1">
                     <a:lumMod val="85000"/>
@@ -4167,7 +4145,7 @@
           </a:p>
           <a:p>
             <a:r>
-              <a:rPr lang="en-US" sz="2400" dirty="0" smtClean="0">
+              <a:rPr lang="en-CA" sz="2400" dirty="0">
                 <a:solidFill>
                   <a:schemeClr val="tx1">
                     <a:lumMod val="85000"/>
@@ -4175,34 +4153,12 @@
                   </a:schemeClr>
                 </a:solidFill>
               </a:rPr>
-              <a:t>I</a:t>
-            </a:r>
-            <a:r>
-              <a:rPr lang="en-US" sz="2400" dirty="0" smtClean="0">
-                <a:solidFill>
-                  <a:schemeClr val="tx1">
-                    <a:lumMod val="85000"/>
-                    <a:lumOff val="15000"/>
-                  </a:schemeClr>
-                </a:solidFill>
-              </a:rPr>
-              <a:t>nitially, e</a:t>
-            </a:r>
-            <a:r>
-              <a:rPr lang="en-US" sz="2400" dirty="0" smtClean="0">
-                <a:solidFill>
-                  <a:schemeClr val="tx1">
-                    <a:lumMod val="85000"/>
-                    <a:lumOff val="15000"/>
-                  </a:schemeClr>
-                </a:solidFill>
-              </a:rPr>
-              <a:t>ach Player will get $10,000</a:t>
-            </a:r>
-          </a:p>
-          <a:p>
-            <a:r>
-              <a:rPr lang="en-US" sz="2400" dirty="0" smtClean="0">
+              <a:t>Initially each Player will get $10,000</a:t>
+            </a:r>
+          </a:p>
+          <a:p>
+            <a:r>
+              <a:rPr lang="en-CA" sz="2400" dirty="0">
                 <a:solidFill>
                   <a:schemeClr val="tx1">
                     <a:lumMod val="85000"/>
@@ -4215,7 +4171,7 @@
           </a:p>
           <a:p>
             <a:r>
-              <a:rPr lang="en-US" sz="2400" dirty="0" smtClean="0">
+              <a:rPr lang="en-CA" sz="2400" dirty="0">
                 <a:solidFill>
                   <a:schemeClr val="tx1">
                     <a:lumMod val="85000"/>
@@ -4223,12 +4179,12 @@
                   </a:schemeClr>
                 </a:solidFill>
               </a:rPr>
-              <a:t>If a Player landed on a property cell, he can buy property cell by paying $2000</a:t>
-            </a:r>
-          </a:p>
-          <a:p>
-            <a:r>
-              <a:rPr lang="en-US" sz="2400" dirty="0" smtClean="0">
+              <a:t>Player can buy property cell for $2000 if landed  on available one</a:t>
+            </a:r>
+          </a:p>
+          <a:p>
+            <a:r>
+              <a:rPr lang="en-CA" sz="2400" dirty="0">
                 <a:solidFill>
                   <a:schemeClr val="tx1">
                     <a:lumMod val="85000"/>
@@ -4236,12 +4192,12 @@
                   </a:schemeClr>
                 </a:solidFill>
               </a:rPr>
-              <a:t>If another Player place the cell, which is owned by another player, he should pay $500</a:t>
-            </a:r>
-          </a:p>
-          <a:p>
-            <a:r>
-              <a:rPr lang="en-US" sz="2400" dirty="0" smtClean="0">
+              <a:t>If Player arrives at a cell which is owned by another player, he should pay $500 rent</a:t>
+            </a:r>
+          </a:p>
+          <a:p>
+            <a:r>
+              <a:rPr lang="en-CA" sz="2400" dirty="0">
                 <a:solidFill>
                   <a:schemeClr val="tx1">
                     <a:lumMod val="85000"/>
@@ -4322,45 +4278,45 @@
           <a:lstStyle/>
           <a:p>
             <a:r>
-              <a:rPr lang="en-US" sz="2400" dirty="0" smtClean="0"/>
+              <a:rPr lang="en-CA" sz="2400" dirty="0"/>
               <a:t>If a Player landed on </a:t>
             </a:r>
             <a:r>
-              <a:rPr lang="en-US" sz="2400" dirty="0" err="1" smtClean="0"/>
+              <a:rPr lang="en-CA" sz="2400" dirty="0" err="1"/>
               <a:t>GotoJail</a:t>
             </a:r>
             <a:r>
-              <a:rPr lang="en-US" sz="2400" dirty="0" smtClean="0"/>
+              <a:rPr lang="en-CA" sz="2400" dirty="0"/>
               <a:t> Cell, he will pay $2000 for fine and move to Jail Cell and will be skipped at the next turn</a:t>
             </a:r>
           </a:p>
           <a:p>
             <a:r>
-              <a:rPr lang="en-US" sz="2400" dirty="0" smtClean="0"/>
+              <a:rPr lang="en-CA" sz="2400" dirty="0"/>
               <a:t>If a Player landed on Jail Cell, he will be skipped at next turn and he will start at next cell</a:t>
             </a:r>
           </a:p>
           <a:p>
             <a:r>
-              <a:rPr lang="en-US" sz="2400" dirty="0" smtClean="0"/>
+              <a:rPr lang="en-CA" sz="2400" dirty="0"/>
               <a:t>If a Player landed on Lot Cell, he will do nothing</a:t>
             </a:r>
           </a:p>
           <a:p>
             <a:r>
-              <a:rPr lang="en-US" sz="2400" dirty="0" smtClean="0"/>
+              <a:rPr lang="en-CA" sz="2400" dirty="0"/>
               <a:t>If a Player can not pay money for rent, buying property, or paying fine due to shortage of cash, he should sell one of his property. </a:t>
             </a:r>
           </a:p>
           <a:p>
             <a:r>
-              <a:rPr lang="en-US" sz="2400" dirty="0" smtClean="0"/>
+              <a:rPr lang="en-CA" sz="2400" dirty="0"/>
               <a:t>All property can be sold with price of 75% of original price. </a:t>
             </a:r>
           </a:p>
           <a:p>
             <a:r>
-              <a:rPr lang="en-US" sz="2400" dirty="0" smtClean="0"/>
+              <a:rPr lang="en-CA" sz="2400" dirty="0"/>
               <a:t>If a Player doesn’t have money after selling property, he will be kicked out of the game. </a:t>
             </a:r>
           </a:p>
@@ -4382,10 +4338,10 @@
           <a:lstStyle/>
           <a:p>
             <a:r>
-              <a:rPr lang="en-US" dirty="0" smtClean="0"/>
+              <a:rPr lang="en-US" b="1" dirty="0" smtClean="0"/>
               <a:t>Game Rules (2/2)</a:t>
             </a:r>
-            <a:endParaRPr lang="en-CA" dirty="0"/>
+            <a:endParaRPr lang="en-CA" b="1" dirty="0"/>
           </a:p>
         </p:txBody>
       </p:sp>
@@ -4607,10 +4563,10 @@
           </a:lstStyle>
           <a:p>
             <a:r>
-              <a:rPr lang="en-US" dirty="0"/>
+              <a:rPr lang="en-US" b="1" dirty="0"/>
               <a:t>Class Design</a:t>
             </a:r>
-            <a:endParaRPr lang="en-CA" dirty="0"/>
+            <a:endParaRPr lang="en-CA" b="1" dirty="0"/>
           </a:p>
         </p:txBody>
       </p:sp>
@@ -4707,7 +4663,7 @@
           <a:p>
             <a:pPr algn="l"/>
             <a:r>
-              <a:rPr lang="en-US" sz="4800" dirty="0" smtClean="0">
+              <a:rPr lang="en-US" sz="4800" b="1" dirty="0" smtClean="0">
                 <a:solidFill>
                   <a:schemeClr val="tx1">
                     <a:lumMod val="65000"/>
@@ -4717,7 +4673,7 @@
               </a:rPr>
               <a:t>Class Diagram</a:t>
             </a:r>
-            <a:endParaRPr lang="en-CA" sz="4800" dirty="0">
+            <a:endParaRPr lang="en-CA" sz="4800" b="1" dirty="0">
               <a:solidFill>
                 <a:schemeClr val="tx1">
                   <a:lumMod val="65000"/>
@@ -4818,10 +4774,10 @@
           <a:lstStyle/>
           <a:p>
             <a:r>
-              <a:rPr lang="en-US" dirty="0" smtClean="0"/>
+              <a:rPr lang="en-US" b="1" dirty="0" smtClean="0"/>
               <a:t>Domain Model</a:t>
             </a:r>
-            <a:endParaRPr lang="en-CA" dirty="0"/>
+            <a:endParaRPr lang="en-CA" b="1" dirty="0"/>
           </a:p>
         </p:txBody>
       </p:sp>
@@ -4944,10 +4900,10 @@
           <a:lstStyle/>
           <a:p>
             <a:r>
-              <a:rPr lang="en-US" dirty="0" smtClean="0"/>
+              <a:rPr lang="en-US" b="1" dirty="0" smtClean="0"/>
               <a:t>Sequence Diagram</a:t>
             </a:r>
-            <a:endParaRPr lang="en-CA" dirty="0"/>
+            <a:endParaRPr lang="en-CA" b="1" dirty="0"/>
           </a:p>
         </p:txBody>
       </p:sp>
@@ -5098,10 +5054,10 @@
           <a:lstStyle/>
           <a:p>
             <a:r>
-              <a:rPr lang="en-US" dirty="0" smtClean="0"/>
+              <a:rPr lang="en-US" b="1" dirty="0" smtClean="0"/>
               <a:t>Test Cases</a:t>
             </a:r>
-            <a:endParaRPr lang="en-CA" dirty="0"/>
+            <a:endParaRPr lang="en-CA" b="1" dirty="0"/>
           </a:p>
         </p:txBody>
       </p:sp>
@@ -5128,12 +5084,12 @@
           <a:graphicData uri="http://schemas.openxmlformats.org/presentationml/2006/ole">
             <mc:AlternateContent xmlns:mc="http://schemas.openxmlformats.org/markup-compatibility/2006">
               <mc:Choice xmlns:v="urn:schemas-microsoft-com:vml" Requires="v">
-                <p:oleObj spid="_x0000_s1031" name="Worksheet" showAsIcon="1" r:id="rId4" imgW="914400" imgH="771480" progId="Excel.Sheet.12">
+                <p:oleObj spid="_x0000_s1032" name="Worksheet" showAsIcon="1" r:id="rId5" imgW="914400" imgH="771480" progId="Excel.Sheet.12">
                   <p:embed/>
                 </p:oleObj>
               </mc:Choice>
               <mc:Fallback>
-                <p:oleObj name="Worksheet" showAsIcon="1" r:id="rId4" imgW="914400" imgH="771480" progId="Excel.Sheet.12">
+                <p:oleObj name="Worksheet" showAsIcon="1" r:id="rId5" imgW="914400" imgH="771480" progId="Excel.Sheet.12">
                   <p:embed/>
                   <p:pic>
                     <p:nvPicPr>
@@ -5142,7 +5098,7 @@
                       <p:nvPr/>
                     </p:nvPicPr>
                     <p:blipFill>
-                      <a:blip r:embed="rId5"/>
+                      <a:blip r:embed="rId6"/>
                       <a:stretch>
                         <a:fillRect/>
                       </a:stretch>

</xml_diff>